<commit_message>
Update PP for Git workshop
</commit_message>
<xml_diff>
--- a/Workshops/Git Intro.pptx
+++ b/Workshops/Git Intro.pptx
@@ -5,7 +5,7 @@
     <p:sldMasterId id="2147483648" r:id="rId1"/>
   </p:sldMasterIdLst>
   <p:notesMasterIdLst>
-    <p:notesMasterId r:id="rId21"/>
+    <p:notesMasterId r:id="rId23"/>
   </p:notesMasterIdLst>
   <p:sldIdLst>
     <p:sldId id="256" r:id="rId2"/>
@@ -27,6 +27,8 @@
     <p:sldId id="272" r:id="rId18"/>
     <p:sldId id="273" r:id="rId19"/>
     <p:sldId id="274" r:id="rId20"/>
+    <p:sldId id="275" r:id="rId21"/>
+    <p:sldId id="276" r:id="rId22"/>
   </p:sldIdLst>
   <p:sldSz cx="12192000" cy="6858000"/>
   <p:notesSz cx="6858000" cy="9144000"/>
@@ -672,11 +674,7 @@
             </a:pPr>
             <a:r>
               <a:rPr lang="en-NZ" dirty="0" smtClean="0"/>
-              <a:t>Changed </a:t>
-            </a:r>
-            <a:r>
-              <a:rPr lang="en-NZ" dirty="0" smtClean="0"/>
-              <a:t>files – new</a:t>
+              <a:t>Changed files – new</a:t>
             </a:r>
             <a:r>
               <a:rPr lang="en-NZ" baseline="0" dirty="0" smtClean="0"/>
@@ -1555,6 +1553,271 @@
 </p:notes>
 </file>
 
+<file path=ppt/notesSlides/notesSlide18.xml><?xml version="1.0" encoding="utf-8"?>
+<p:notes xmlns:a="http://schemas.openxmlformats.org/drawingml/2006/main" xmlns:r="http://schemas.openxmlformats.org/officeDocument/2006/relationships" xmlns:p="http://schemas.openxmlformats.org/presentationml/2006/main">
+  <p:cSld>
+    <p:spTree>
+      <p:nvGrpSpPr>
+        <p:cNvPr id="1" name=""/>
+        <p:cNvGrpSpPr/>
+        <p:nvPr/>
+      </p:nvGrpSpPr>
+      <p:grpSpPr>
+        <a:xfrm>
+          <a:off x="0" y="0"/>
+          <a:ext cx="0" cy="0"/>
+          <a:chOff x="0" y="0"/>
+          <a:chExt cx="0" cy="0"/>
+        </a:xfrm>
+      </p:grpSpPr>
+      <p:sp>
+        <p:nvSpPr>
+          <p:cNvPr id="2" name="Slide Image Placeholder 1"/>
+          <p:cNvSpPr>
+            <a:spLocks noGrp="1" noRot="1" noChangeAspect="1"/>
+          </p:cNvSpPr>
+          <p:nvPr>
+            <p:ph type="sldImg"/>
+          </p:nvPr>
+        </p:nvSpPr>
+        <p:spPr/>
+      </p:sp>
+      <p:sp>
+        <p:nvSpPr>
+          <p:cNvPr id="3" name="Notes Placeholder 2"/>
+          <p:cNvSpPr>
+            <a:spLocks noGrp="1"/>
+          </p:cNvSpPr>
+          <p:nvPr>
+            <p:ph type="body" idx="1"/>
+          </p:nvPr>
+        </p:nvSpPr>
+        <p:spPr/>
+        <p:txBody>
+          <a:bodyPr/>
+          <a:lstStyle/>
+          <a:p>
+            <a:pPr marL="171450" indent="-171450">
+              <a:buFont typeface="Arial" panose="020B0604020202020204" pitchFamily="34" charset="0"/>
+              <a:buChar char="•"/>
+            </a:pPr>
+            <a:r>
+              <a:rPr lang="en-NZ" b="0" i="0" baseline="0" dirty="0" smtClean="0"/>
+              <a:t>We can track changes on this repository by click on “# commits”</a:t>
+            </a:r>
+          </a:p>
+          <a:p>
+            <a:pPr marL="171450" indent="-171450">
+              <a:buFont typeface="Arial" panose="020B0604020202020204" pitchFamily="34" charset="0"/>
+              <a:buChar char="•"/>
+            </a:pPr>
+            <a:r>
+              <a:rPr lang="en-NZ" b="0" i="0" baseline="0" dirty="0" smtClean="0"/>
+              <a:t>The # represents the number of commits made to this branch</a:t>
+            </a:r>
+            <a:endParaRPr lang="en-NZ" b="0" i="0" baseline="0" dirty="0" smtClean="0"/>
+          </a:p>
+        </p:txBody>
+      </p:sp>
+      <p:sp>
+        <p:nvSpPr>
+          <p:cNvPr id="4" name="Slide Number Placeholder 3"/>
+          <p:cNvSpPr>
+            <a:spLocks noGrp="1"/>
+          </p:cNvSpPr>
+          <p:nvPr>
+            <p:ph type="sldNum" sz="quarter" idx="10"/>
+          </p:nvPr>
+        </p:nvSpPr>
+        <p:spPr/>
+        <p:txBody>
+          <a:bodyPr/>
+          <a:lstStyle/>
+          <a:p>
+            <a:fld id="{12FF5A28-F489-364E-AEDB-387A53AA762A}" type="slidenum">
+              <a:rPr lang="en-US" smtClean="0"/>
+              <a:t>20</a:t>
+            </a:fld>
+            <a:endParaRPr lang="en-US"/>
+          </a:p>
+        </p:txBody>
+      </p:sp>
+    </p:spTree>
+    <p:extLst>
+      <p:ext uri="{BB962C8B-B14F-4D97-AF65-F5344CB8AC3E}">
+        <p14:creationId xmlns:p14="http://schemas.microsoft.com/office/powerpoint/2010/main" val="4172937563"/>
+      </p:ext>
+    </p:extLst>
+  </p:cSld>
+  <p:clrMapOvr>
+    <a:masterClrMapping/>
+  </p:clrMapOvr>
+</p:notes>
+</file>
+
+<file path=ppt/notesSlides/notesSlide19.xml><?xml version="1.0" encoding="utf-8"?>
+<p:notes xmlns:a="http://schemas.openxmlformats.org/drawingml/2006/main" xmlns:r="http://schemas.openxmlformats.org/officeDocument/2006/relationships" xmlns:p="http://schemas.openxmlformats.org/presentationml/2006/main">
+  <p:cSld>
+    <p:spTree>
+      <p:nvGrpSpPr>
+        <p:cNvPr id="1" name=""/>
+        <p:cNvGrpSpPr/>
+        <p:nvPr/>
+      </p:nvGrpSpPr>
+      <p:grpSpPr>
+        <a:xfrm>
+          <a:off x="0" y="0"/>
+          <a:ext cx="0" cy="0"/>
+          <a:chOff x="0" y="0"/>
+          <a:chExt cx="0" cy="0"/>
+        </a:xfrm>
+      </p:grpSpPr>
+      <p:sp>
+        <p:nvSpPr>
+          <p:cNvPr id="2" name="Slide Image Placeholder 1"/>
+          <p:cNvSpPr>
+            <a:spLocks noGrp="1" noRot="1" noChangeAspect="1"/>
+          </p:cNvSpPr>
+          <p:nvPr>
+            <p:ph type="sldImg"/>
+          </p:nvPr>
+        </p:nvSpPr>
+        <p:spPr/>
+      </p:sp>
+      <p:sp>
+        <p:nvSpPr>
+          <p:cNvPr id="3" name="Notes Placeholder 2"/>
+          <p:cNvSpPr>
+            <a:spLocks noGrp="1"/>
+          </p:cNvSpPr>
+          <p:nvPr>
+            <p:ph type="body" idx="1"/>
+          </p:nvPr>
+        </p:nvSpPr>
+        <p:spPr/>
+        <p:txBody>
+          <a:bodyPr/>
+          <a:lstStyle/>
+          <a:p>
+            <a:pPr marL="171450" indent="-171450">
+              <a:buFont typeface="Arial" panose="020B0604020202020204" pitchFamily="34" charset="0"/>
+              <a:buChar char="•"/>
+            </a:pPr>
+            <a:r>
+              <a:rPr lang="en-NZ" b="0" i="0" baseline="0" dirty="0" smtClean="0"/>
+              <a:t>Here we can view our remote repositories commit history</a:t>
+            </a:r>
+          </a:p>
+          <a:p>
+            <a:pPr marL="171450" indent="-171450">
+              <a:buFont typeface="Arial" panose="020B0604020202020204" pitchFamily="34" charset="0"/>
+              <a:buChar char="•"/>
+            </a:pPr>
+            <a:r>
+              <a:rPr lang="en-NZ" b="0" i="0" baseline="0" dirty="0" smtClean="0"/>
+              <a:t>Information includes:</a:t>
+            </a:r>
+          </a:p>
+          <a:p>
+            <a:pPr marL="628650" lvl="1" indent="-171450">
+              <a:buFont typeface="Arial" panose="020B0604020202020204" pitchFamily="34" charset="0"/>
+              <a:buChar char="•"/>
+            </a:pPr>
+            <a:r>
+              <a:rPr lang="en-NZ" b="0" i="0" baseline="0" dirty="0" smtClean="0"/>
+              <a:t>The commit message</a:t>
+            </a:r>
+          </a:p>
+          <a:p>
+            <a:pPr marL="628650" lvl="1" indent="-171450">
+              <a:buFont typeface="Arial" panose="020B0604020202020204" pitchFamily="34" charset="0"/>
+              <a:buChar char="•"/>
+            </a:pPr>
+            <a:r>
+              <a:rPr lang="en-NZ" b="0" i="0" baseline="0" dirty="0" smtClean="0"/>
+              <a:t>The commit author</a:t>
+            </a:r>
+          </a:p>
+          <a:p>
+            <a:pPr marL="628650" lvl="1" indent="-171450">
+              <a:buFont typeface="Arial" panose="020B0604020202020204" pitchFamily="34" charset="0"/>
+              <a:buChar char="•"/>
+            </a:pPr>
+            <a:r>
+              <a:rPr lang="en-NZ" b="0" i="0" baseline="0" dirty="0" smtClean="0"/>
+              <a:t>The commit time</a:t>
+            </a:r>
+          </a:p>
+          <a:p>
+            <a:pPr marL="628650" lvl="1" indent="-171450">
+              <a:buFont typeface="Arial" panose="020B0604020202020204" pitchFamily="34" charset="0"/>
+              <a:buChar char="•"/>
+            </a:pPr>
+            <a:r>
+              <a:rPr lang="en-NZ" b="0" i="0" baseline="0" dirty="0" smtClean="0"/>
+              <a:t>The file changes</a:t>
+            </a:r>
+          </a:p>
+          <a:p>
+            <a:pPr marL="628650" lvl="1" indent="-171450">
+              <a:buFont typeface="Arial" panose="020B0604020202020204" pitchFamily="34" charset="0"/>
+              <a:buChar char="•"/>
+            </a:pPr>
+            <a:r>
+              <a:rPr lang="en-NZ" b="0" i="0" baseline="0" dirty="0" smtClean="0"/>
+              <a:t>The repository at this point </a:t>
+            </a:r>
+            <a:r>
+              <a:rPr lang="en-NZ" b="0" i="0" baseline="0" smtClean="0"/>
+              <a:t>in time</a:t>
+            </a:r>
+            <a:endParaRPr lang="en-NZ" b="0" i="0" baseline="0" dirty="0" smtClean="0"/>
+          </a:p>
+          <a:p>
+            <a:pPr marL="171450" indent="-171450">
+              <a:buFont typeface="Arial" panose="020B0604020202020204" pitchFamily="34" charset="0"/>
+              <a:buChar char="•"/>
+            </a:pPr>
+            <a:endParaRPr lang="en-NZ" b="0" i="0" baseline="0" dirty="0" smtClean="0"/>
+          </a:p>
+        </p:txBody>
+      </p:sp>
+      <p:sp>
+        <p:nvSpPr>
+          <p:cNvPr id="4" name="Slide Number Placeholder 3"/>
+          <p:cNvSpPr>
+            <a:spLocks noGrp="1"/>
+          </p:cNvSpPr>
+          <p:nvPr>
+            <p:ph type="sldNum" sz="quarter" idx="10"/>
+          </p:nvPr>
+        </p:nvSpPr>
+        <p:spPr/>
+        <p:txBody>
+          <a:bodyPr/>
+          <a:lstStyle/>
+          <a:p>
+            <a:fld id="{12FF5A28-F489-364E-AEDB-387A53AA762A}" type="slidenum">
+              <a:rPr lang="en-US" smtClean="0"/>
+              <a:t>21</a:t>
+            </a:fld>
+            <a:endParaRPr lang="en-US"/>
+          </a:p>
+        </p:txBody>
+      </p:sp>
+    </p:spTree>
+    <p:extLst>
+      <p:ext uri="{BB962C8B-B14F-4D97-AF65-F5344CB8AC3E}">
+        <p14:creationId xmlns:p14="http://schemas.microsoft.com/office/powerpoint/2010/main" val="1801326920"/>
+      </p:ext>
+    </p:extLst>
+  </p:cSld>
+  <p:clrMapOvr>
+    <a:masterClrMapping/>
+  </p:clrMapOvr>
+</p:notes>
+</file>
+
 <file path=ppt/notesSlides/notesSlide2.xml><?xml version="1.0" encoding="utf-8"?>
 <p:notes xmlns:a="http://schemas.openxmlformats.org/drawingml/2006/main" xmlns:r="http://schemas.openxmlformats.org/officeDocument/2006/relationships" xmlns:p="http://schemas.openxmlformats.org/presentationml/2006/main">
   <p:cSld>
@@ -1962,11 +2225,7 @@
             </a:r>
             <a:r>
               <a:rPr lang="en-NZ" baseline="0" dirty="0" smtClean="0"/>
-              <a:t> to </a:t>
-            </a:r>
-            <a:r>
-              <a:rPr lang="en-NZ" baseline="0" dirty="0" smtClean="0"/>
-              <a:t>GitHub and either create new account or login</a:t>
+              <a:t> to GitHub and either create new account or login</a:t>
             </a:r>
           </a:p>
           <a:p>
@@ -8078,6 +8337,450 @@
 </p:sld>
 </file>
 
+<file path=ppt/slides/slide20.xml><?xml version="1.0" encoding="utf-8"?>
+<p:sld xmlns:a="http://schemas.openxmlformats.org/drawingml/2006/main" xmlns:r="http://schemas.openxmlformats.org/officeDocument/2006/relationships" xmlns:p="http://schemas.openxmlformats.org/presentationml/2006/main">
+  <p:cSld>
+    <p:bg>
+      <p:bgPr>
+        <a:solidFill>
+          <a:srgbClr val="F4CBB2"/>
+        </a:solidFill>
+        <a:effectLst/>
+      </p:bgPr>
+    </p:bg>
+    <p:spTree>
+      <p:nvGrpSpPr>
+        <p:cNvPr id="1" name=""/>
+        <p:cNvGrpSpPr/>
+        <p:nvPr/>
+      </p:nvGrpSpPr>
+      <p:grpSpPr>
+        <a:xfrm>
+          <a:off x="0" y="0"/>
+          <a:ext cx="0" cy="0"/>
+          <a:chOff x="0" y="0"/>
+          <a:chExt cx="0" cy="0"/>
+        </a:xfrm>
+      </p:grpSpPr>
+      <p:sp>
+        <p:nvSpPr>
+          <p:cNvPr id="5" name="TextBox 4"/>
+          <p:cNvSpPr txBox="1"/>
+          <p:nvPr/>
+        </p:nvSpPr>
+        <p:spPr>
+          <a:xfrm>
+            <a:off x="0" y="0"/>
+            <a:ext cx="12191999" cy="1477328"/>
+          </a:xfrm>
+          <a:prstGeom prst="rect">
+            <a:avLst/>
+          </a:prstGeom>
+          <a:noFill/>
+        </p:spPr>
+        <p:txBody>
+          <a:bodyPr wrap="square" rtlCol="0">
+            <a:spAutoFit/>
+          </a:bodyPr>
+          <a:lstStyle/>
+          <a:p>
+            <a:pPr algn="ctr"/>
+            <a:endParaRPr lang="en-US" sz="4500" dirty="0" smtClean="0"/>
+          </a:p>
+          <a:p>
+            <a:pPr algn="ctr"/>
+            <a:r>
+              <a:rPr lang="en-NZ" sz="4500" dirty="0" smtClean="0"/>
+              <a:t>Track changes</a:t>
+            </a:r>
+            <a:endParaRPr lang="en-US" sz="2500" dirty="0" smtClean="0"/>
+          </a:p>
+        </p:txBody>
+      </p:sp>
+      <p:grpSp>
+        <p:nvGrpSpPr>
+          <p:cNvPr id="6" name="Group 5"/>
+          <p:cNvGrpSpPr/>
+          <p:nvPr/>
+        </p:nvGrpSpPr>
+        <p:grpSpPr>
+          <a:xfrm>
+            <a:off x="10249685" y="6111669"/>
+            <a:ext cx="1829241" cy="635050"/>
+            <a:chOff x="898038" y="2564515"/>
+            <a:chExt cx="10661022" cy="3701143"/>
+          </a:xfrm>
+        </p:grpSpPr>
+        <p:pic>
+          <p:nvPicPr>
+            <p:cNvPr id="7" name="Picture 6"/>
+            <p:cNvPicPr>
+              <a:picLocks noChangeAspect="1"/>
+            </p:cNvPicPr>
+            <p:nvPr/>
+          </p:nvPicPr>
+          <p:blipFill>
+            <a:blip r:embed="rId3">
+              <a:duotone>
+                <a:schemeClr val="accent3">
+                  <a:shade val="45000"/>
+                  <a:satMod val="135000"/>
+                </a:schemeClr>
+                <a:prstClr val="white"/>
+              </a:duotone>
+              <a:extLst>
+                <a:ext uri="{28A0092B-C50C-407E-A947-70E740481C1C}">
+                  <a14:useLocalDpi xmlns:a14="http://schemas.microsoft.com/office/drawing/2010/main" val="0"/>
+                </a:ext>
+              </a:extLst>
+            </a:blip>
+            <a:stretch>
+              <a:fillRect/>
+            </a:stretch>
+          </p:blipFill>
+          <p:spPr>
+            <a:xfrm>
+              <a:off x="898038" y="3118803"/>
+              <a:ext cx="6208519" cy="2592568"/>
+            </a:xfrm>
+            <a:prstGeom prst="rect">
+              <a:avLst/>
+            </a:prstGeom>
+          </p:spPr>
+        </p:pic>
+        <p:pic>
+          <p:nvPicPr>
+            <p:cNvPr id="8" name="Picture 7"/>
+            <p:cNvPicPr>
+              <a:picLocks noChangeAspect="1"/>
+            </p:cNvPicPr>
+            <p:nvPr/>
+          </p:nvPicPr>
+          <p:blipFill>
+            <a:blip r:embed="rId4">
+              <a:duotone>
+                <a:schemeClr val="accent3">
+                  <a:shade val="45000"/>
+                  <a:satMod val="135000"/>
+                </a:schemeClr>
+                <a:prstClr val="white"/>
+              </a:duotone>
+              <a:extLst>
+                <a:ext uri="{28A0092B-C50C-407E-A947-70E740481C1C}">
+                  <a14:useLocalDpi xmlns:a14="http://schemas.microsoft.com/office/drawing/2010/main" val="0"/>
+                </a:ext>
+              </a:extLst>
+            </a:blip>
+            <a:stretch>
+              <a:fillRect/>
+            </a:stretch>
+          </p:blipFill>
+          <p:spPr>
+            <a:xfrm>
+              <a:off x="7106557" y="2564515"/>
+              <a:ext cx="4452503" cy="3701143"/>
+            </a:xfrm>
+            <a:prstGeom prst="rect">
+              <a:avLst/>
+            </a:prstGeom>
+          </p:spPr>
+        </p:pic>
+      </p:grpSp>
+      <p:pic>
+        <p:nvPicPr>
+          <p:cNvPr id="2" name="Picture 1"/>
+          <p:cNvPicPr>
+            <a:picLocks noChangeAspect="1"/>
+          </p:cNvPicPr>
+          <p:nvPr/>
+        </p:nvPicPr>
+        <p:blipFill>
+          <a:blip r:embed="rId5">
+            <a:extLst>
+              <a:ext uri="{28A0092B-C50C-407E-A947-70E740481C1C}">
+                <a14:useLocalDpi xmlns:a14="http://schemas.microsoft.com/office/drawing/2010/main" val="0"/>
+              </a:ext>
+            </a:extLst>
+          </a:blip>
+          <a:stretch>
+            <a:fillRect/>
+          </a:stretch>
+        </p:blipFill>
+        <p:spPr>
+          <a:xfrm>
+            <a:off x="1747836" y="1735475"/>
+            <a:ext cx="8699373" cy="4118046"/>
+          </a:xfrm>
+          <a:prstGeom prst="rect">
+            <a:avLst/>
+          </a:prstGeom>
+        </p:spPr>
+      </p:pic>
+      <p:sp>
+        <p:nvSpPr>
+          <p:cNvPr id="4" name="Oval 3"/>
+          <p:cNvSpPr/>
+          <p:nvPr/>
+        </p:nvSpPr>
+        <p:spPr>
+          <a:xfrm>
+            <a:off x="2171700" y="3333750"/>
+            <a:ext cx="1104900" cy="400050"/>
+          </a:xfrm>
+          <a:prstGeom prst="ellipse">
+            <a:avLst/>
+          </a:prstGeom>
+          <a:noFill/>
+          <a:ln>
+            <a:solidFill>
+              <a:schemeClr val="tx1"/>
+            </a:solidFill>
+          </a:ln>
+        </p:spPr>
+        <p:style>
+          <a:lnRef idx="2">
+            <a:schemeClr val="accent1">
+              <a:shade val="50000"/>
+            </a:schemeClr>
+          </a:lnRef>
+          <a:fillRef idx="1">
+            <a:schemeClr val="accent1"/>
+          </a:fillRef>
+          <a:effectRef idx="0">
+            <a:schemeClr val="accent1"/>
+          </a:effectRef>
+          <a:fontRef idx="minor">
+            <a:schemeClr val="lt1"/>
+          </a:fontRef>
+        </p:style>
+        <p:txBody>
+          <a:bodyPr rtlCol="0" anchor="ctr"/>
+          <a:lstStyle/>
+          <a:p>
+            <a:pPr algn="ctr"/>
+            <a:endParaRPr lang="en-NZ"/>
+          </a:p>
+        </p:txBody>
+      </p:sp>
+    </p:spTree>
+    <p:extLst>
+      <p:ext uri="{BB962C8B-B14F-4D97-AF65-F5344CB8AC3E}">
+        <p14:creationId xmlns:p14="http://schemas.microsoft.com/office/powerpoint/2010/main" val="3836985808"/>
+      </p:ext>
+    </p:extLst>
+  </p:cSld>
+  <p:clrMapOvr>
+    <a:masterClrMapping/>
+  </p:clrMapOvr>
+  <p:timing>
+    <p:tnLst>
+      <p:par>
+        <p:cTn id="1" dur="indefinite" restart="never" nodeType="tmRoot"/>
+      </p:par>
+    </p:tnLst>
+  </p:timing>
+</p:sld>
+</file>
+
+<file path=ppt/slides/slide21.xml><?xml version="1.0" encoding="utf-8"?>
+<p:sld xmlns:a="http://schemas.openxmlformats.org/drawingml/2006/main" xmlns:r="http://schemas.openxmlformats.org/officeDocument/2006/relationships" xmlns:p="http://schemas.openxmlformats.org/presentationml/2006/main">
+  <p:cSld>
+    <p:bg>
+      <p:bgPr>
+        <a:solidFill>
+          <a:srgbClr val="F4CBB2"/>
+        </a:solidFill>
+        <a:effectLst/>
+      </p:bgPr>
+    </p:bg>
+    <p:spTree>
+      <p:nvGrpSpPr>
+        <p:cNvPr id="1" name=""/>
+        <p:cNvGrpSpPr/>
+        <p:nvPr/>
+      </p:nvGrpSpPr>
+      <p:grpSpPr>
+        <a:xfrm>
+          <a:off x="0" y="0"/>
+          <a:ext cx="0" cy="0"/>
+          <a:chOff x="0" y="0"/>
+          <a:chExt cx="0" cy="0"/>
+        </a:xfrm>
+      </p:grpSpPr>
+      <p:sp>
+        <p:nvSpPr>
+          <p:cNvPr id="5" name="TextBox 4"/>
+          <p:cNvSpPr txBox="1"/>
+          <p:nvPr/>
+        </p:nvSpPr>
+        <p:spPr>
+          <a:xfrm>
+            <a:off x="0" y="0"/>
+            <a:ext cx="12191999" cy="1477328"/>
+          </a:xfrm>
+          <a:prstGeom prst="rect">
+            <a:avLst/>
+          </a:prstGeom>
+          <a:noFill/>
+        </p:spPr>
+        <p:txBody>
+          <a:bodyPr wrap="square" rtlCol="0">
+            <a:spAutoFit/>
+          </a:bodyPr>
+          <a:lstStyle/>
+          <a:p>
+            <a:pPr algn="ctr"/>
+            <a:endParaRPr lang="en-US" sz="4500" dirty="0" smtClean="0"/>
+          </a:p>
+          <a:p>
+            <a:pPr algn="ctr"/>
+            <a:r>
+              <a:rPr lang="en-NZ" sz="4500" dirty="0" smtClean="0"/>
+              <a:t>Track changes</a:t>
+            </a:r>
+            <a:endParaRPr lang="en-US" sz="2500" dirty="0" smtClean="0"/>
+          </a:p>
+        </p:txBody>
+      </p:sp>
+      <p:grpSp>
+        <p:nvGrpSpPr>
+          <p:cNvPr id="6" name="Group 5"/>
+          <p:cNvGrpSpPr/>
+          <p:nvPr/>
+        </p:nvGrpSpPr>
+        <p:grpSpPr>
+          <a:xfrm>
+            <a:off x="10249685" y="6111669"/>
+            <a:ext cx="1829241" cy="635050"/>
+            <a:chOff x="898038" y="2564515"/>
+            <a:chExt cx="10661022" cy="3701143"/>
+          </a:xfrm>
+        </p:grpSpPr>
+        <p:pic>
+          <p:nvPicPr>
+            <p:cNvPr id="7" name="Picture 6"/>
+            <p:cNvPicPr>
+              <a:picLocks noChangeAspect="1"/>
+            </p:cNvPicPr>
+            <p:nvPr/>
+          </p:nvPicPr>
+          <p:blipFill>
+            <a:blip r:embed="rId3">
+              <a:duotone>
+                <a:schemeClr val="accent3">
+                  <a:shade val="45000"/>
+                  <a:satMod val="135000"/>
+                </a:schemeClr>
+                <a:prstClr val="white"/>
+              </a:duotone>
+              <a:extLst>
+                <a:ext uri="{28A0092B-C50C-407E-A947-70E740481C1C}">
+                  <a14:useLocalDpi xmlns:a14="http://schemas.microsoft.com/office/drawing/2010/main" val="0"/>
+                </a:ext>
+              </a:extLst>
+            </a:blip>
+            <a:stretch>
+              <a:fillRect/>
+            </a:stretch>
+          </p:blipFill>
+          <p:spPr>
+            <a:xfrm>
+              <a:off x="898038" y="3118803"/>
+              <a:ext cx="6208519" cy="2592568"/>
+            </a:xfrm>
+            <a:prstGeom prst="rect">
+              <a:avLst/>
+            </a:prstGeom>
+          </p:spPr>
+        </p:pic>
+        <p:pic>
+          <p:nvPicPr>
+            <p:cNvPr id="8" name="Picture 7"/>
+            <p:cNvPicPr>
+              <a:picLocks noChangeAspect="1"/>
+            </p:cNvPicPr>
+            <p:nvPr/>
+          </p:nvPicPr>
+          <p:blipFill>
+            <a:blip r:embed="rId4">
+              <a:duotone>
+                <a:schemeClr val="accent3">
+                  <a:shade val="45000"/>
+                  <a:satMod val="135000"/>
+                </a:schemeClr>
+                <a:prstClr val="white"/>
+              </a:duotone>
+              <a:extLst>
+                <a:ext uri="{28A0092B-C50C-407E-A947-70E740481C1C}">
+                  <a14:useLocalDpi xmlns:a14="http://schemas.microsoft.com/office/drawing/2010/main" val="0"/>
+                </a:ext>
+              </a:extLst>
+            </a:blip>
+            <a:stretch>
+              <a:fillRect/>
+            </a:stretch>
+          </p:blipFill>
+          <p:spPr>
+            <a:xfrm>
+              <a:off x="7106557" y="2564515"/>
+              <a:ext cx="4452503" cy="3701143"/>
+            </a:xfrm>
+            <a:prstGeom prst="rect">
+              <a:avLst/>
+            </a:prstGeom>
+          </p:spPr>
+        </p:pic>
+      </p:grpSp>
+      <p:pic>
+        <p:nvPicPr>
+          <p:cNvPr id="3" name="Picture 2"/>
+          <p:cNvPicPr>
+            <a:picLocks noChangeAspect="1"/>
+          </p:cNvPicPr>
+          <p:nvPr/>
+        </p:nvPicPr>
+        <p:blipFill>
+          <a:blip r:embed="rId5">
+            <a:extLst>
+              <a:ext uri="{28A0092B-C50C-407E-A947-70E740481C1C}">
+                <a14:useLocalDpi xmlns:a14="http://schemas.microsoft.com/office/drawing/2010/main" val="0"/>
+              </a:ext>
+            </a:extLst>
+          </a:blip>
+          <a:stretch>
+            <a:fillRect/>
+          </a:stretch>
+        </p:blipFill>
+        <p:spPr>
+          <a:xfrm>
+            <a:off x="1252537" y="1827514"/>
+            <a:ext cx="9686925" cy="4029075"/>
+          </a:xfrm>
+          <a:prstGeom prst="rect">
+            <a:avLst/>
+          </a:prstGeom>
+        </p:spPr>
+      </p:pic>
+    </p:spTree>
+    <p:extLst>
+      <p:ext uri="{BB962C8B-B14F-4D97-AF65-F5344CB8AC3E}">
+        <p14:creationId xmlns:p14="http://schemas.microsoft.com/office/powerpoint/2010/main" val="1018535163"/>
+      </p:ext>
+    </p:extLst>
+  </p:cSld>
+  <p:clrMapOvr>
+    <a:masterClrMapping/>
+  </p:clrMapOvr>
+  <p:timing>
+    <p:tnLst>
+      <p:par>
+        <p:cTn id="1" dur="indefinite" restart="never" nodeType="tmRoot"/>
+      </p:par>
+    </p:tnLst>
+  </p:timing>
+</p:sld>
+</file>
+
 <file path=ppt/slides/slide3.xml><?xml version="1.0" encoding="utf-8"?>
 <p:sld xmlns:a="http://schemas.openxmlformats.org/drawingml/2006/main" xmlns:r="http://schemas.openxmlformats.org/officeDocument/2006/relationships" xmlns:p="http://schemas.openxmlformats.org/presentationml/2006/main">
   <p:cSld>
@@ -9315,11 +10018,11 @@
   <p:clrMapOvr>
     <a:masterClrMapping/>
   </p:clrMapOvr>
-  <mc:AlternateContent xmlns:mc="http://schemas.openxmlformats.org/markup-compatibility/2006">
-    <mc:Choice xmlns:p14="http://schemas.microsoft.com/office/powerpoint/2010/main" Requires="p14">
+  <mc:AlternateContent xmlns:mc="http://schemas.openxmlformats.org/markup-compatibility/2006" xmlns:p14="http://schemas.microsoft.com/office/powerpoint/2010/main">
+    <mc:Choice Requires="p14">
       <p:transition spd="slow" p14:dur="2000"/>
     </mc:Choice>
-    <mc:Fallback>
+    <mc:Fallback xmlns="">
       <p:transition spd="slow"/>
     </mc:Fallback>
   </mc:AlternateContent>
@@ -9605,7 +10308,6 @@
               <a:rPr lang="en-US" sz="4500" dirty="0" smtClean="0"/>
               <a:t>Cloning a repository</a:t>
             </a:r>
-            <a:endParaRPr lang="en-US" sz="4500" dirty="0" smtClean="0"/>
           </a:p>
           <a:p>
             <a:pPr algn="ctr"/>
@@ -9868,7 +10570,6 @@
               <a:rPr lang="en-US" sz="4500" dirty="0" smtClean="0"/>
               <a:t>Cloning a repository</a:t>
             </a:r>
-            <a:endParaRPr lang="en-US" sz="4500" dirty="0" smtClean="0"/>
           </a:p>
           <a:p>
             <a:pPr algn="ctr"/>

</xml_diff>

<commit_message>
Update Pro Prac PP and ad Jupyter Notebooks for OOSD
</commit_message>
<xml_diff>
--- a/Workshops/Git Intro.pptx
+++ b/Workshops/Git Intro.pptx
@@ -228,7 +228,7 @@
           <a:p>
             <a:fld id="{B20A1C99-0E2F-0548-A15B-2D1809D1E4CF}" type="datetimeFigureOut">
               <a:rPr lang="en-US" smtClean="0"/>
-              <a:t>9/10/2019</a:t>
+              <a:t>9/10/19</a:t>
             </a:fld>
             <a:endParaRPr lang="en-US"/>
           </a:p>
@@ -902,7 +902,11 @@
             </a:r>
             <a:r>
               <a:rPr lang="en-NZ" b="0" baseline="0" dirty="0" smtClean="0"/>
-              <a:t> yourself with the statuses – this example doesn’t tell us much</a:t>
+              <a:t> yourself with the </a:t>
+            </a:r>
+            <a:r>
+              <a:rPr lang="en-NZ" b="0" baseline="0" dirty="0" smtClean="0"/>
+              <a:t>statuses</a:t>
             </a:r>
           </a:p>
           <a:p>
@@ -912,7 +916,11 @@
             </a:pPr>
             <a:r>
               <a:rPr lang="en-NZ" b="0" baseline="0" dirty="0" smtClean="0"/>
-              <a:t>You can almost guarantee there are no conflicts</a:t>
+              <a:t>You </a:t>
+            </a:r>
+            <a:r>
+              <a:rPr lang="en-NZ" b="0" baseline="0" dirty="0" smtClean="0"/>
+              <a:t>can almost guarantee there are no conflicts</a:t>
             </a:r>
             <a:endParaRPr lang="en-NZ" b="0" dirty="0"/>
           </a:p>
@@ -1126,7 +1134,7 @@
             </a:r>
             <a:r>
               <a:rPr lang="en-NZ" b="0" i="0" baseline="0" dirty="0" smtClean="0"/>
-              <a:t> we go back to GitHub and refresh the page we will see the file(s) in our remote repository</a:t>
+              <a:t> we go back to GitHub and refresh the page, we will see the file(s) in our remote repository</a:t>
             </a:r>
           </a:p>
           <a:p>
@@ -1136,7 +1144,23 @@
             </a:pPr>
             <a:r>
               <a:rPr lang="en-NZ" b="0" i="0" baseline="0" dirty="0" smtClean="0"/>
-              <a:t>We can create new files and upload existing files, but unfortunately we can’t do this with directories</a:t>
+              <a:t>We can create new files and upload existing </a:t>
+            </a:r>
+            <a:r>
+              <a:rPr lang="en-NZ" b="0" i="0" baseline="0" dirty="0" smtClean="0"/>
+              <a:t>files on GitHub, </a:t>
+            </a:r>
+            <a:r>
+              <a:rPr lang="en-NZ" b="0" i="0" baseline="0" dirty="0" smtClean="0"/>
+              <a:t>but unfortunately we can’t do </a:t>
+            </a:r>
+            <a:r>
+              <a:rPr lang="en-NZ" b="0" i="0" baseline="0" dirty="0" smtClean="0"/>
+              <a:t>the same thing </a:t>
+            </a:r>
+            <a:r>
+              <a:rPr lang="en-NZ" b="0" i="0" baseline="0" dirty="0" smtClean="0"/>
+              <a:t>with directories</a:t>
             </a:r>
             <a:endParaRPr lang="en-NZ" b="0" i="0" dirty="0"/>
           </a:p>
@@ -1263,7 +1287,15 @@
             </a:pPr>
             <a:r>
               <a:rPr lang="en-NZ" b="0" i="0" baseline="0" dirty="0" smtClean="0"/>
-              <a:t>Scroll to the bottom and click on the bright green “Commit new file” button</a:t>
+              <a:t>Scroll to the bottom and click on the </a:t>
+            </a:r>
+            <a:r>
+              <a:rPr lang="en-NZ" b="0" i="0" baseline="0" dirty="0" smtClean="0"/>
+              <a:t>“</a:t>
+            </a:r>
+            <a:r>
+              <a:rPr lang="en-NZ" b="0" i="0" baseline="0" dirty="0" smtClean="0"/>
+              <a:t>Commit new file” button</a:t>
             </a:r>
           </a:p>
           <a:p>
@@ -1273,7 +1305,15 @@
             </a:pPr>
             <a:r>
               <a:rPr lang="en-NZ" b="0" i="0" baseline="0" dirty="0" smtClean="0"/>
-              <a:t>This will commit directly to the master branch</a:t>
+              <a:t>This will commit </a:t>
+            </a:r>
+            <a:r>
+              <a:rPr lang="en-NZ" b="0" i="0" baseline="0" dirty="0" smtClean="0"/>
+              <a:t>your new file to </a:t>
+            </a:r>
+            <a:r>
+              <a:rPr lang="en-NZ" b="0" i="0" baseline="0" dirty="0" smtClean="0"/>
+              <a:t>the master branch</a:t>
             </a:r>
             <a:endParaRPr lang="en-NZ" b="0" i="0" dirty="0" smtClean="0"/>
           </a:p>
@@ -1379,7 +1419,7 @@
             </a:pPr>
             <a:r>
               <a:rPr lang="en-NZ" b="0" i="0" baseline="0" dirty="0" smtClean="0"/>
-              <a:t>How do I get this into my local repository???</a:t>
+              <a:t>This doesn’t appear in my local copy. How can I get this???</a:t>
             </a:r>
             <a:endParaRPr lang="en-NZ" b="0" i="0" dirty="0" smtClean="0"/>
           </a:p>
@@ -1475,8 +1515,13 @@
             </a:r>
             <a:r>
               <a:rPr lang="en-NZ" b="0" i="0" baseline="0" dirty="0" smtClean="0"/>
-              <a:t> you won’t see test-3.txt until you run the correct command</a:t>
-            </a:r>
+              <a:t> you won’t see test-3.txt until you run the </a:t>
+            </a:r>
+            <a:r>
+              <a:rPr lang="en-NZ" b="0" i="0" baseline="0" dirty="0" smtClean="0"/>
+              <a:t>following command</a:t>
+            </a:r>
+            <a:endParaRPr lang="en-NZ" b="0" i="0" baseline="0" dirty="0" smtClean="0"/>
           </a:p>
           <a:p>
             <a:pPr marL="171450" indent="-171450">
@@ -1615,7 +1660,6 @@
               <a:rPr lang="en-NZ" b="0" i="0" baseline="0" dirty="0" smtClean="0"/>
               <a:t>The # represents the number of commits made to this branch</a:t>
             </a:r>
-            <a:endParaRPr lang="en-NZ" b="0" i="0" baseline="0" dirty="0" smtClean="0"/>
           </a:p>
         </p:txBody>
       </p:sp>
@@ -1765,14 +1809,16 @@
             </a:pPr>
             <a:r>
               <a:rPr lang="en-NZ" b="0" i="0" baseline="0" dirty="0" smtClean="0"/>
-              <a:t>The repository at this point in time</a:t>
-            </a:r>
-          </a:p>
-          <a:p>
-            <a:pPr marL="171450" indent="-171450">
-              <a:buFont typeface="Arial" panose="020B0604020202020204" pitchFamily="34" charset="0"/>
-              <a:buChar char="•"/>
-            </a:pPr>
+              <a:t>The repository at this point </a:t>
+            </a:r>
+            <a:r>
+              <a:rPr lang="en-NZ" b="0" i="0" baseline="0" smtClean="0"/>
+              <a:t>in </a:t>
+            </a:r>
+            <a:r>
+              <a:rPr lang="en-NZ" b="0" i="0" baseline="0" smtClean="0"/>
+              <a:t>time</a:t>
+            </a:r>
             <a:endParaRPr lang="en-NZ" b="0" i="0" baseline="0" dirty="0" smtClean="0"/>
           </a:p>
         </p:txBody>
@@ -1862,12 +1908,8 @@
               <a:buChar char="•"/>
             </a:pPr>
             <a:r>
-              <a:rPr lang="en-NZ" dirty="0" smtClean="0"/>
-              <a:t>Promotes collaboration –</a:t>
-            </a:r>
-            <a:r>
               <a:rPr lang="en-NZ" baseline="0" dirty="0" smtClean="0"/>
-              <a:t> doesn’t matter where in the world you are</a:t>
+              <a:t>Git promotes collaboration. We can collaborate with developers in Australia, USA, everywhere around the world!!!</a:t>
             </a:r>
           </a:p>
         </p:txBody>
@@ -1958,7 +2000,11 @@
             </a:pPr>
             <a:r>
               <a:rPr lang="en-NZ" dirty="0" smtClean="0"/>
-              <a:t>Git is a distributed version control system</a:t>
+              <a:t>Git is a distributed version control </a:t>
+            </a:r>
+            <a:r>
+              <a:rPr lang="en-NZ" dirty="0" smtClean="0"/>
+              <a:t>system</a:t>
             </a:r>
           </a:p>
           <a:p>
@@ -1968,27 +2014,42 @@
             </a:pPr>
             <a:r>
               <a:rPr lang="en-NZ" dirty="0" smtClean="0"/>
-              <a:t>Examples of centralised</a:t>
+              <a:t>CSV</a:t>
             </a:r>
             <a:r>
               <a:rPr lang="en-NZ" baseline="0" dirty="0" smtClean="0"/>
-              <a:t> version control systems are </a:t>
-            </a:r>
-            <a:r>
-              <a:rPr lang="en-NZ" b="1" baseline="0" dirty="0" smtClean="0"/>
-              <a:t>CVS</a:t>
-            </a:r>
+              <a:t> and Subversion are examples of centralised VCS which are still heavily used within the industry</a:t>
+            </a:r>
+          </a:p>
+          <a:p>
+            <a:pPr marL="171450" marR="0" indent="-171450" algn="l" defTabSz="914400" rtl="0" eaLnBrk="1" fontAlgn="auto" latinLnBrk="0" hangingPunct="1">
+              <a:lnSpc>
+                <a:spcPct val="100000"/>
+              </a:lnSpc>
+              <a:spcBef>
+                <a:spcPts val="0"/>
+              </a:spcBef>
+              <a:spcAft>
+                <a:spcPts val="0"/>
+              </a:spcAft>
+              <a:buClrTx/>
+              <a:buSzTx/>
+              <a:buFont typeface="Arial" panose="020B0604020202020204" pitchFamily="34" charset="0"/>
+              <a:buChar char="•"/>
+              <a:tabLst/>
+              <a:defRPr/>
+            </a:pPr>
             <a:r>
               <a:rPr lang="en-NZ" baseline="0" dirty="0" smtClean="0"/>
-              <a:t> and </a:t>
-            </a:r>
-            <a:r>
-              <a:rPr lang="en-NZ" b="1" baseline="0" dirty="0" smtClean="0"/>
-              <a:t>Subversion</a:t>
+              <a:t>Centralised VCS </a:t>
+            </a:r>
+            <a:r>
+              <a:rPr lang="mr-IN" baseline="0" dirty="0" smtClean="0"/>
+              <a:t>–</a:t>
             </a:r>
             <a:r>
               <a:rPr lang="en-NZ" baseline="0" dirty="0" smtClean="0"/>
-              <a:t> – still used within the industry</a:t>
+              <a:t> the code lives on a server and everything lives in one place. Developers need special permissions to be able to add code to the repository</a:t>
             </a:r>
           </a:p>
           <a:p>
@@ -1998,39 +2059,16 @@
             </a:pPr>
             <a:r>
               <a:rPr lang="en-NZ" baseline="0" dirty="0" smtClean="0"/>
-              <a:t>Centralised means that the code lives on a server – everything lives in one place</a:t>
-            </a:r>
-          </a:p>
-          <a:p>
-            <a:pPr marL="171450" indent="-171450">
-              <a:buFont typeface="Arial" panose="020B0604020202020204" pitchFamily="34" charset="0"/>
-              <a:buChar char="•"/>
-            </a:pPr>
+              <a:t>Distributed VCS </a:t>
+            </a:r>
+            <a:r>
+              <a:rPr lang="mr-IN" baseline="0" dirty="0" smtClean="0"/>
+              <a:t>–</a:t>
+            </a:r>
             <a:r>
               <a:rPr lang="en-NZ" baseline="0" dirty="0" smtClean="0"/>
-              <a:t>Developers need special permissions to be able to add code to the repository</a:t>
-            </a:r>
-          </a:p>
-          <a:p>
-            <a:pPr marL="171450" indent="-171450">
-              <a:buFont typeface="Arial" panose="020B0604020202020204" pitchFamily="34" charset="0"/>
-              <a:buChar char="•"/>
-            </a:pPr>
-            <a:r>
-              <a:rPr lang="en-NZ" baseline="0" dirty="0" smtClean="0"/>
-              <a:t>Distributed – you get your own repository when you clone the project</a:t>
-            </a:r>
-          </a:p>
-          <a:p>
-            <a:pPr marL="171450" indent="-171450">
-              <a:buFont typeface="Arial" panose="020B0604020202020204" pitchFamily="34" charset="0"/>
-              <a:buChar char="•"/>
-            </a:pPr>
-            <a:r>
-              <a:rPr lang="en-NZ" baseline="0" dirty="0" smtClean="0"/>
-              <a:t>You can work and add code to the repository even when offline, since the repository lives on your computer locally</a:t>
-            </a:r>
-            <a:endParaRPr lang="en-NZ" dirty="0"/>
+              <a:t> you get your own repository when you clone a project. You can work on and add code to the repository even when you are offline, since we have access to a local copy</a:t>
+            </a:r>
           </a:p>
         </p:txBody>
       </p:sp>
@@ -2230,8 +2268,13 @@
             </a:pPr>
             <a:r>
               <a:rPr lang="en-NZ" baseline="0" dirty="0" smtClean="0"/>
-              <a:t>On the left-hand side on your homepage there is a bright green button called “New”</a:t>
-            </a:r>
+              <a:t>On the left-hand side on your </a:t>
+            </a:r>
+            <a:r>
+              <a:rPr lang="en-NZ" baseline="0" dirty="0" smtClean="0"/>
+              <a:t>homepage there is a button called “New”. Click on this to create a new repository</a:t>
+            </a:r>
+            <a:endParaRPr lang="en-NZ" baseline="0" dirty="0" smtClean="0"/>
           </a:p>
           <a:p>
             <a:pPr marL="171450" indent="-171450">
@@ -2240,8 +2283,9 @@
             </a:pPr>
             <a:r>
               <a:rPr lang="en-NZ" baseline="0" dirty="0" smtClean="0"/>
-              <a:t>Click on the button and you will be redirected to this page</a:t>
-            </a:r>
+              <a:t>You will be redirect to this page</a:t>
+            </a:r>
+            <a:endParaRPr lang="en-NZ" baseline="0" dirty="0" smtClean="0"/>
           </a:p>
           <a:p>
             <a:pPr marL="171450" indent="-171450">
@@ -2548,7 +2592,7 @@
             </a:r>
             <a:r>
               <a:rPr lang="en-NZ" baseline="0" dirty="0" smtClean="0"/>
-              <a:t> to go through the concepts of branches, but we are currently on the master branch (default)</a:t>
+              <a:t> to go through the concept of branches, but we are currently on the master branch (default)</a:t>
             </a:r>
             <a:endParaRPr lang="en-NZ" dirty="0" smtClean="0"/>
           </a:p>
@@ -2573,7 +2617,7 @@
             </a:r>
             <a:r>
               <a:rPr lang="en-NZ" b="0" baseline="0" dirty="0" smtClean="0"/>
-              <a:t> two files called test-1.txt and test-2.txt – in Linux we use the </a:t>
+              <a:t> two files called test-1.txt and test-2.txt – in Linux, we use the </a:t>
             </a:r>
             <a:r>
               <a:rPr lang="en-NZ" b="1" i="1" baseline="0" dirty="0" smtClean="0"/>
@@ -2581,8 +2625,13 @@
             </a:r>
             <a:r>
               <a:rPr lang="en-NZ" b="0" baseline="0" dirty="0" smtClean="0"/>
-              <a:t> command. Of course, you can manually do this</a:t>
-            </a:r>
+              <a:t> command. </a:t>
+            </a:r>
+            <a:r>
+              <a:rPr lang="en-NZ" b="0" baseline="0" dirty="0" smtClean="0"/>
+              <a:t>You can also do this manually </a:t>
+            </a:r>
+            <a:endParaRPr lang="en-NZ" b="0" baseline="0" dirty="0" smtClean="0"/>
           </a:p>
           <a:p>
             <a:pPr marL="171450" indent="-171450">
@@ -2591,7 +2640,15 @@
             </a:pPr>
             <a:r>
               <a:rPr lang="en-NZ" b="0" baseline="0" dirty="0" smtClean="0"/>
-              <a:t>Create an empty directory call sub-app – don’t put any files in here</a:t>
+              <a:t>Create an empty directory call </a:t>
+            </a:r>
+            <a:r>
+              <a:rPr lang="en-NZ" b="0" baseline="0" dirty="0" smtClean="0"/>
+              <a:t>sub-app, but </a:t>
+            </a:r>
+            <a:r>
+              <a:rPr lang="en-NZ" b="0" baseline="0" dirty="0" smtClean="0"/>
+              <a:t>don’t put any files in here</a:t>
             </a:r>
             <a:endParaRPr lang="en-NZ" b="0" dirty="0"/>
           </a:p>
@@ -2705,7 +2762,15 @@
             </a:r>
             <a:r>
               <a:rPr lang="en-NZ" b="0" baseline="0" dirty="0" smtClean="0"/>
-              <a:t>, we are add this file to the staging area ready for committing</a:t>
+              <a:t>, we are adding this </a:t>
+            </a:r>
+            <a:r>
+              <a:rPr lang="en-NZ" b="0" baseline="0" dirty="0" smtClean="0"/>
+              <a:t>file </a:t>
+            </a:r>
+            <a:r>
+              <a:rPr lang="en-NZ" b="0" baseline="0" dirty="0" smtClean="0"/>
+              <a:t>to the staging area ready for committing</a:t>
             </a:r>
           </a:p>
           <a:p>
@@ -2715,7 +2780,7 @@
             </a:pPr>
             <a:r>
               <a:rPr lang="en-NZ" b="0" baseline="0" dirty="0" smtClean="0"/>
-              <a:t>We can of course remove this file if we don’t want to commit it – type </a:t>
+              <a:t>We can remove this file if we don’t want to commit it – type </a:t>
             </a:r>
             <a:r>
               <a:rPr lang="en-NZ" b="1" i="1" baseline="0" dirty="0" smtClean="0"/>
@@ -2727,37 +2792,13 @@
             </a:r>
             <a:r>
               <a:rPr lang="en-NZ" b="1" i="1" baseline="0" dirty="0" smtClean="0"/>
-              <a:t> –cached &lt;file&gt;</a:t>
-            </a:r>
-          </a:p>
-          <a:p>
-            <a:pPr marL="171450" indent="-171450">
-              <a:buFont typeface="Arial" panose="020B0604020202020204" pitchFamily="34" charset="0"/>
-              <a:buChar char="•"/>
-            </a:pPr>
-            <a:r>
-              <a:rPr lang="en-NZ" b="0" baseline="0" dirty="0" smtClean="0"/>
-              <a:t>The best thing about Git is the messages – </a:t>
+              <a:t> –cached &lt;file</a:t>
             </a:r>
             <a:r>
               <a:rPr lang="en-NZ" b="1" i="1" baseline="0" dirty="0" smtClean="0"/>
-              <a:t>git status </a:t>
-            </a:r>
-            <a:r>
-              <a:rPr lang="en-NZ" b="0" baseline="0" dirty="0" smtClean="0"/>
-              <a:t>is a very handle command</a:t>
-            </a:r>
-          </a:p>
-          <a:p>
-            <a:pPr marL="171450" indent="-171450">
-              <a:buFont typeface="Arial" panose="020B0604020202020204" pitchFamily="34" charset="0"/>
-              <a:buChar char="•"/>
-            </a:pPr>
-            <a:r>
-              <a:rPr lang="en-NZ" b="0" baseline="0" dirty="0" smtClean="0"/>
-              <a:t>No commits yet…</a:t>
-            </a:r>
-            <a:endParaRPr lang="en-NZ" b="1" dirty="0"/>
+              <a:t>&gt;</a:t>
+            </a:r>
+            <a:endParaRPr lang="en-NZ" b="1" i="1" baseline="0" dirty="0" smtClean="0"/>
           </a:p>
         </p:txBody>
       </p:sp>
@@ -2928,7 +2969,7 @@
           <a:p>
             <a:fld id="{340BE638-7E53-8F4C-AF39-E07C0AA6BC33}" type="datetimeFigureOut">
               <a:rPr lang="en-US" smtClean="0"/>
-              <a:t>9/10/2019</a:t>
+              <a:t>9/10/19</a:t>
             </a:fld>
             <a:endParaRPr lang="en-US"/>
           </a:p>
@@ -3098,7 +3139,7 @@
           <a:p>
             <a:fld id="{340BE638-7E53-8F4C-AF39-E07C0AA6BC33}" type="datetimeFigureOut">
               <a:rPr lang="en-US" smtClean="0"/>
-              <a:t>9/10/2019</a:t>
+              <a:t>9/10/19</a:t>
             </a:fld>
             <a:endParaRPr lang="en-US"/>
           </a:p>
@@ -3278,7 +3319,7 @@
           <a:p>
             <a:fld id="{340BE638-7E53-8F4C-AF39-E07C0AA6BC33}" type="datetimeFigureOut">
               <a:rPr lang="en-US" smtClean="0"/>
-              <a:t>9/10/2019</a:t>
+              <a:t>9/10/19</a:t>
             </a:fld>
             <a:endParaRPr lang="en-US"/>
           </a:p>
@@ -3448,7 +3489,7 @@
           <a:p>
             <a:fld id="{340BE638-7E53-8F4C-AF39-E07C0AA6BC33}" type="datetimeFigureOut">
               <a:rPr lang="en-US" smtClean="0"/>
-              <a:t>9/10/2019</a:t>
+              <a:t>9/10/19</a:t>
             </a:fld>
             <a:endParaRPr lang="en-US"/>
           </a:p>
@@ -3694,7 +3735,7 @@
           <a:p>
             <a:fld id="{340BE638-7E53-8F4C-AF39-E07C0AA6BC33}" type="datetimeFigureOut">
               <a:rPr lang="en-US" smtClean="0"/>
-              <a:t>9/10/2019</a:t>
+              <a:t>9/10/19</a:t>
             </a:fld>
             <a:endParaRPr lang="en-US"/>
           </a:p>
@@ -3926,7 +3967,7 @@
           <a:p>
             <a:fld id="{340BE638-7E53-8F4C-AF39-E07C0AA6BC33}" type="datetimeFigureOut">
               <a:rPr lang="en-US" smtClean="0"/>
-              <a:t>9/10/2019</a:t>
+              <a:t>9/10/19</a:t>
             </a:fld>
             <a:endParaRPr lang="en-US"/>
           </a:p>
@@ -4293,7 +4334,7 @@
           <a:p>
             <a:fld id="{340BE638-7E53-8F4C-AF39-E07C0AA6BC33}" type="datetimeFigureOut">
               <a:rPr lang="en-US" smtClean="0"/>
-              <a:t>9/10/2019</a:t>
+              <a:t>9/10/19</a:t>
             </a:fld>
             <a:endParaRPr lang="en-US"/>
           </a:p>
@@ -4411,7 +4452,7 @@
           <a:p>
             <a:fld id="{340BE638-7E53-8F4C-AF39-E07C0AA6BC33}" type="datetimeFigureOut">
               <a:rPr lang="en-US" smtClean="0"/>
-              <a:t>9/10/2019</a:t>
+              <a:t>9/10/19</a:t>
             </a:fld>
             <a:endParaRPr lang="en-US"/>
           </a:p>
@@ -4506,7 +4547,7 @@
           <a:p>
             <a:fld id="{340BE638-7E53-8F4C-AF39-E07C0AA6BC33}" type="datetimeFigureOut">
               <a:rPr lang="en-US" smtClean="0"/>
-              <a:t>9/10/2019</a:t>
+              <a:t>9/10/19</a:t>
             </a:fld>
             <a:endParaRPr lang="en-US"/>
           </a:p>
@@ -4783,7 +4824,7 @@
           <a:p>
             <a:fld id="{340BE638-7E53-8F4C-AF39-E07C0AA6BC33}" type="datetimeFigureOut">
               <a:rPr lang="en-US" smtClean="0"/>
-              <a:t>9/10/2019</a:t>
+              <a:t>9/10/19</a:t>
             </a:fld>
             <a:endParaRPr lang="en-US"/>
           </a:p>
@@ -5036,7 +5077,7 @@
           <a:p>
             <a:fld id="{340BE638-7E53-8F4C-AF39-E07C0AA6BC33}" type="datetimeFigureOut">
               <a:rPr lang="en-US" smtClean="0"/>
-              <a:t>9/10/2019</a:t>
+              <a:t>9/10/19</a:t>
             </a:fld>
             <a:endParaRPr lang="en-US"/>
           </a:p>
@@ -5249,7 +5290,7 @@
           <a:p>
             <a:fld id="{340BE638-7E53-8F4C-AF39-E07C0AA6BC33}" type="datetimeFigureOut">
               <a:rPr lang="en-US" smtClean="0"/>
-              <a:t>9/10/2019</a:t>
+              <a:t>9/10/19</a:t>
             </a:fld>
             <a:endParaRPr lang="en-US"/>
           </a:p>
@@ -6374,14 +6415,14 @@
                 <a:gridCol w="4064000">
                   <a:extLst>
                     <a:ext uri="{9D8B030D-6E8A-4147-A177-3AD203B41FA5}">
-                      <a16:colId xmlns:a16="http://schemas.microsoft.com/office/drawing/2014/main" val="3306683555"/>
+                      <a16:colId xmlns="" xmlns:a16="http://schemas.microsoft.com/office/drawing/2014/main" val="3306683555"/>
                     </a:ext>
                   </a:extLst>
                 </a:gridCol>
                 <a:gridCol w="4064000">
                   <a:extLst>
                     <a:ext uri="{9D8B030D-6E8A-4147-A177-3AD203B41FA5}">
-                      <a16:colId xmlns:a16="http://schemas.microsoft.com/office/drawing/2014/main" val="3122824698"/>
+                      <a16:colId xmlns="" xmlns:a16="http://schemas.microsoft.com/office/drawing/2014/main" val="3122824698"/>
                     </a:ext>
                   </a:extLst>
                 </a:gridCol>
@@ -6419,7 +6460,7 @@
                 </a:tc>
                 <a:extLst>
                   <a:ext uri="{0D108BD9-81ED-4DB2-BD59-A6C34878D82A}">
-                    <a16:rowId xmlns:a16="http://schemas.microsoft.com/office/drawing/2014/main" val="1535492939"/>
+                    <a16:rowId xmlns="" xmlns:a16="http://schemas.microsoft.com/office/drawing/2014/main" val="1535492939"/>
                   </a:ext>
                 </a:extLst>
               </a:tr>
@@ -6456,7 +6497,7 @@
                 </a:tc>
                 <a:extLst>
                   <a:ext uri="{0D108BD9-81ED-4DB2-BD59-A6C34878D82A}">
-                    <a16:rowId xmlns:a16="http://schemas.microsoft.com/office/drawing/2014/main" val="2894951384"/>
+                    <a16:rowId xmlns="" xmlns:a16="http://schemas.microsoft.com/office/drawing/2014/main" val="2894951384"/>
                   </a:ext>
                 </a:extLst>
               </a:tr>
@@ -6513,7 +6554,7 @@
                 </a:tc>
                 <a:extLst>
                   <a:ext uri="{0D108BD9-81ED-4DB2-BD59-A6C34878D82A}">
-                    <a16:rowId xmlns:a16="http://schemas.microsoft.com/office/drawing/2014/main" val="1160171538"/>
+                    <a16:rowId xmlns="" xmlns:a16="http://schemas.microsoft.com/office/drawing/2014/main" val="1160171538"/>
                   </a:ext>
                 </a:extLst>
               </a:tr>
@@ -6554,7 +6595,7 @@
                 </a:tc>
                 <a:extLst>
                   <a:ext uri="{0D108BD9-81ED-4DB2-BD59-A6C34878D82A}">
-                    <a16:rowId xmlns:a16="http://schemas.microsoft.com/office/drawing/2014/main" val="1841383775"/>
+                    <a16:rowId xmlns="" xmlns:a16="http://schemas.microsoft.com/office/drawing/2014/main" val="1841383775"/>
                   </a:ext>
                 </a:extLst>
               </a:tr>
@@ -6595,7 +6636,7 @@
                 </a:tc>
                 <a:extLst>
                   <a:ext uri="{0D108BD9-81ED-4DB2-BD59-A6C34878D82A}">
-                    <a16:rowId xmlns:a16="http://schemas.microsoft.com/office/drawing/2014/main" val="3026743774"/>
+                    <a16:rowId xmlns="" xmlns:a16="http://schemas.microsoft.com/office/drawing/2014/main" val="3026743774"/>
                   </a:ext>
                 </a:extLst>
               </a:tr>
@@ -9419,14 +9460,14 @@
                 <a:gridCol w="4064000">
                   <a:extLst>
                     <a:ext uri="{9D8B030D-6E8A-4147-A177-3AD203B41FA5}">
-                      <a16:colId xmlns:a16="http://schemas.microsoft.com/office/drawing/2014/main" val="20000"/>
+                      <a16:colId xmlns="" xmlns:a16="http://schemas.microsoft.com/office/drawing/2014/main" val="20000"/>
                     </a:ext>
                   </a:extLst>
                 </a:gridCol>
                 <a:gridCol w="4064000">
                   <a:extLst>
                     <a:ext uri="{9D8B030D-6E8A-4147-A177-3AD203B41FA5}">
-                      <a16:colId xmlns:a16="http://schemas.microsoft.com/office/drawing/2014/main" val="20001"/>
+                      <a16:colId xmlns="" xmlns:a16="http://schemas.microsoft.com/office/drawing/2014/main" val="20001"/>
                     </a:ext>
                   </a:extLst>
                 </a:gridCol>
@@ -9464,7 +9505,7 @@
                 </a:tc>
                 <a:extLst>
                   <a:ext uri="{0D108BD9-81ED-4DB2-BD59-A6C34878D82A}">
-                    <a16:rowId xmlns:a16="http://schemas.microsoft.com/office/drawing/2014/main" val="10000"/>
+                    <a16:rowId xmlns="" xmlns:a16="http://schemas.microsoft.com/office/drawing/2014/main" val="10000"/>
                   </a:ext>
                 </a:extLst>
               </a:tr>
@@ -9509,7 +9550,7 @@
                 </a:tc>
                 <a:extLst>
                   <a:ext uri="{0D108BD9-81ED-4DB2-BD59-A6C34878D82A}">
-                    <a16:rowId xmlns:a16="http://schemas.microsoft.com/office/drawing/2014/main" val="10001"/>
+                    <a16:rowId xmlns="" xmlns:a16="http://schemas.microsoft.com/office/drawing/2014/main" val="10001"/>
                   </a:ext>
                 </a:extLst>
               </a:tr>
@@ -9546,7 +9587,7 @@
                 </a:tc>
                 <a:extLst>
                   <a:ext uri="{0D108BD9-81ED-4DB2-BD59-A6C34878D82A}">
-                    <a16:rowId xmlns:a16="http://schemas.microsoft.com/office/drawing/2014/main" val="10002"/>
+                    <a16:rowId xmlns="" xmlns:a16="http://schemas.microsoft.com/office/drawing/2014/main" val="10002"/>
                   </a:ext>
                 </a:extLst>
               </a:tr>
@@ -9587,7 +9628,7 @@
                 </a:tc>
                 <a:extLst>
                   <a:ext uri="{0D108BD9-81ED-4DB2-BD59-A6C34878D82A}">
-                    <a16:rowId xmlns:a16="http://schemas.microsoft.com/office/drawing/2014/main" val="10003"/>
+                    <a16:rowId xmlns="" xmlns:a16="http://schemas.microsoft.com/office/drawing/2014/main" val="10003"/>
                   </a:ext>
                 </a:extLst>
               </a:tr>
@@ -9624,7 +9665,7 @@
                 </a:tc>
                 <a:extLst>
                   <a:ext uri="{0D108BD9-81ED-4DB2-BD59-A6C34878D82A}">
-                    <a16:rowId xmlns:a16="http://schemas.microsoft.com/office/drawing/2014/main" val="10004"/>
+                    <a16:rowId xmlns="" xmlns:a16="http://schemas.microsoft.com/office/drawing/2014/main" val="10004"/>
                   </a:ext>
                 </a:extLst>
               </a:tr>
@@ -9665,7 +9706,7 @@
                 </a:tc>
                 <a:extLst>
                   <a:ext uri="{0D108BD9-81ED-4DB2-BD59-A6C34878D82A}">
-                    <a16:rowId xmlns:a16="http://schemas.microsoft.com/office/drawing/2014/main" val="10005"/>
+                    <a16:rowId xmlns="" xmlns:a16="http://schemas.microsoft.com/office/drawing/2014/main" val="10005"/>
                   </a:ext>
                 </a:extLst>
               </a:tr>
@@ -9702,7 +9743,7 @@
                 </a:tc>
                 <a:extLst>
                   <a:ext uri="{0D108BD9-81ED-4DB2-BD59-A6C34878D82A}">
-                    <a16:rowId xmlns:a16="http://schemas.microsoft.com/office/drawing/2014/main" val="10006"/>
+                    <a16:rowId xmlns="" xmlns:a16="http://schemas.microsoft.com/office/drawing/2014/main" val="10006"/>
                   </a:ext>
                 </a:extLst>
               </a:tr>
@@ -9739,7 +9780,7 @@
                 </a:tc>
                 <a:extLst>
                   <a:ext uri="{0D108BD9-81ED-4DB2-BD59-A6C34878D82A}">
-                    <a16:rowId xmlns:a16="http://schemas.microsoft.com/office/drawing/2014/main" val="10007"/>
+                    <a16:rowId xmlns="" xmlns:a16="http://schemas.microsoft.com/office/drawing/2014/main" val="10007"/>
                   </a:ext>
                 </a:extLst>
               </a:tr>

</xml_diff>